<commit_message>
Final version with presentation
</commit_message>
<xml_diff>
--- a/Apresentacao.pptx
+++ b/Apresentacao.pptx
@@ -203,7 +203,7 @@
               <a:cs typeface="+mn-cs"/>
             </a:defRPr>
           </a:pPr>
-          <a:endParaRPr lang="en-US"/>
+          <a:endParaRPr lang="pt-PT"/>
         </a:p>
       </c:txPr>
     </c:title>
@@ -254,7 +254,7 @@
                     <a:cs typeface="+mn-cs"/>
                   </a:defRPr>
                 </a:pPr>
-                <a:endParaRPr lang="en-US"/>
+                <a:endParaRPr lang="pt-PT"/>
               </a:p>
             </c:txPr>
             <c:dLblPos val="outEnd"/>
@@ -410,7 +410,7 @@
                   <a:cs typeface="+mn-cs"/>
                 </a:defRPr>
               </a:pPr>
-              <a:endParaRPr lang="en-US"/>
+              <a:endParaRPr lang="pt-PT"/>
             </a:p>
           </c:txPr>
         </c:title>
@@ -448,7 +448,7 @@
                 <a:cs typeface="+mn-cs"/>
               </a:defRPr>
             </a:pPr>
-            <a:endParaRPr lang="en-US"/>
+            <a:endParaRPr lang="pt-PT"/>
           </a:p>
         </c:txPr>
         <c:crossAx val="616005807"/>
@@ -530,7 +530,7 @@
                   <a:cs typeface="+mn-cs"/>
                 </a:defRPr>
               </a:pPr>
-              <a:endParaRPr lang="en-US"/>
+              <a:endParaRPr lang="pt-PT"/>
             </a:p>
           </c:txPr>
         </c:title>
@@ -562,7 +562,7 @@
                 <a:cs typeface="+mn-cs"/>
               </a:defRPr>
             </a:pPr>
-            <a:endParaRPr lang="en-US"/>
+            <a:endParaRPr lang="pt-PT"/>
           </a:p>
         </c:txPr>
         <c:crossAx val="616005391"/>
@@ -595,7 +595,7 @@
       <a:pPr>
         <a:defRPr/>
       </a:pPr>
-      <a:endParaRPr lang="en-US"/>
+      <a:endParaRPr lang="pt-PT"/>
     </a:p>
   </c:txPr>
   <c:externalData r:id="rId3">
@@ -674,7 +674,7 @@
               <a:cs typeface="+mn-cs"/>
             </a:defRPr>
           </a:pPr>
-          <a:endParaRPr lang="en-US"/>
+          <a:endParaRPr lang="pt-PT"/>
         </a:p>
       </c:txPr>
     </c:title>
@@ -736,7 +736,7 @@
                     <a:cs typeface="+mn-cs"/>
                   </a:defRPr>
                 </a:pPr>
-                <a:endParaRPr lang="en-US"/>
+                <a:endParaRPr lang="pt-PT"/>
               </a:p>
             </c:txPr>
             <c:dLblPos val="outEnd"/>
@@ -897,7 +897,7 @@
                   <a:cs typeface="+mn-cs"/>
                 </a:defRPr>
               </a:pPr>
-              <a:endParaRPr lang="en-US"/>
+              <a:endParaRPr lang="pt-PT"/>
             </a:p>
           </c:txPr>
         </c:title>
@@ -935,7 +935,7 @@
                 <a:cs typeface="+mn-cs"/>
               </a:defRPr>
             </a:pPr>
-            <a:endParaRPr lang="en-US"/>
+            <a:endParaRPr lang="pt-PT"/>
           </a:p>
         </c:txPr>
         <c:crossAx val="626367615"/>
@@ -1017,7 +1017,7 @@
                   <a:cs typeface="+mn-cs"/>
                 </a:defRPr>
               </a:pPr>
-              <a:endParaRPr lang="en-US"/>
+              <a:endParaRPr lang="pt-PT"/>
             </a:p>
           </c:txPr>
         </c:title>
@@ -1049,7 +1049,7 @@
                 <a:cs typeface="+mn-cs"/>
               </a:defRPr>
             </a:pPr>
-            <a:endParaRPr lang="en-US"/>
+            <a:endParaRPr lang="pt-PT"/>
           </a:p>
         </c:txPr>
         <c:crossAx val="626367199"/>
@@ -1082,7 +1082,7 @@
       <a:pPr>
         <a:defRPr/>
       </a:pPr>
-      <a:endParaRPr lang="en-US"/>
+      <a:endParaRPr lang="pt-PT"/>
     </a:p>
   </c:txPr>
   <c:externalData r:id="rId3">
@@ -1747,7 +1747,7 @@
                   <a:cs typeface="+mn-cs"/>
                 </a:defRPr>
               </a:pPr>
-              <a:endParaRPr lang="en-US"/>
+              <a:endParaRPr lang="pt-PT"/>
             </a:p>
           </c:txPr>
         </c:title>
@@ -1785,7 +1785,7 @@
                 <a:cs typeface="+mn-cs"/>
               </a:defRPr>
             </a:pPr>
-            <a:endParaRPr lang="en-US"/>
+            <a:endParaRPr lang="pt-PT"/>
           </a:p>
         </c:txPr>
         <c:crossAx val="618726767"/>
@@ -1864,7 +1864,7 @@
                   <a:cs typeface="+mn-cs"/>
                 </a:defRPr>
               </a:pPr>
-              <a:endParaRPr lang="en-US"/>
+              <a:endParaRPr lang="pt-PT"/>
             </a:p>
           </c:txPr>
         </c:title>
@@ -1902,7 +1902,7 @@
                 <a:cs typeface="+mn-cs"/>
               </a:defRPr>
             </a:pPr>
-            <a:endParaRPr lang="en-US"/>
+            <a:endParaRPr lang="pt-PT"/>
           </a:p>
         </c:txPr>
         <c:crossAx val="618728431"/>
@@ -1942,7 +1942,7 @@
       <a:pPr>
         <a:defRPr/>
       </a:pPr>
-      <a:endParaRPr lang="en-US"/>
+      <a:endParaRPr lang="pt-PT"/>
     </a:p>
   </c:txPr>
   <c:externalData r:id="rId3">
@@ -2022,7 +2022,7 @@
               <a:cs typeface="+mn-cs"/>
             </a:defRPr>
           </a:pPr>
-          <a:endParaRPr lang="en-US"/>
+          <a:endParaRPr lang="pt-PT"/>
         </a:p>
       </c:txPr>
     </c:title>
@@ -2073,7 +2073,7 @@
                     <a:cs typeface="+mn-cs"/>
                   </a:defRPr>
                 </a:pPr>
-                <a:endParaRPr lang="en-US"/>
+                <a:endParaRPr lang="pt-PT"/>
               </a:p>
             </c:txPr>
             <c:dLblPos val="outEnd"/>
@@ -2229,7 +2229,7 @@
                   <a:cs typeface="+mn-cs"/>
                 </a:defRPr>
               </a:pPr>
-              <a:endParaRPr lang="en-US"/>
+              <a:endParaRPr lang="pt-PT"/>
             </a:p>
           </c:txPr>
         </c:title>
@@ -2267,7 +2267,7 @@
                 <a:cs typeface="+mn-cs"/>
               </a:defRPr>
             </a:pPr>
-            <a:endParaRPr lang="en-US"/>
+            <a:endParaRPr lang="pt-PT"/>
           </a:p>
         </c:txPr>
         <c:crossAx val="614485439"/>
@@ -2349,7 +2349,7 @@
                   <a:cs typeface="+mn-cs"/>
                 </a:defRPr>
               </a:pPr>
-              <a:endParaRPr lang="en-US"/>
+              <a:endParaRPr lang="pt-PT"/>
             </a:p>
           </c:txPr>
         </c:title>
@@ -2381,7 +2381,7 @@
                 <a:cs typeface="+mn-cs"/>
               </a:defRPr>
             </a:pPr>
-            <a:endParaRPr lang="en-US"/>
+            <a:endParaRPr lang="pt-PT"/>
           </a:p>
         </c:txPr>
         <c:crossAx val="172563295"/>
@@ -2414,7 +2414,7 @@
       <a:pPr>
         <a:defRPr/>
       </a:pPr>
-      <a:endParaRPr lang="en-US"/>
+      <a:endParaRPr lang="pt-PT"/>
     </a:p>
   </c:txPr>
   <c:externalData r:id="rId3">
@@ -2494,7 +2494,7 @@
               <a:cs typeface="+mn-cs"/>
             </a:defRPr>
           </a:pPr>
-          <a:endParaRPr lang="en-US"/>
+          <a:endParaRPr lang="pt-PT"/>
         </a:p>
       </c:txPr>
     </c:title>
@@ -2545,7 +2545,7 @@
                     <a:cs typeface="+mn-cs"/>
                   </a:defRPr>
                 </a:pPr>
-                <a:endParaRPr lang="en-US"/>
+                <a:endParaRPr lang="pt-PT"/>
               </a:p>
             </c:txPr>
             <c:dLblPos val="outEnd"/>
@@ -2701,7 +2701,7 @@
                   <a:cs typeface="+mn-cs"/>
                 </a:defRPr>
               </a:pPr>
-              <a:endParaRPr lang="en-US"/>
+              <a:endParaRPr lang="pt-PT"/>
             </a:p>
           </c:txPr>
         </c:title>
@@ -2739,7 +2739,7 @@
                 <a:cs typeface="+mn-cs"/>
               </a:defRPr>
             </a:pPr>
-            <a:endParaRPr lang="en-US"/>
+            <a:endParaRPr lang="pt-PT"/>
           </a:p>
         </c:txPr>
         <c:crossAx val="627676143"/>
@@ -2821,7 +2821,7 @@
                   <a:cs typeface="+mn-cs"/>
                 </a:defRPr>
               </a:pPr>
-              <a:endParaRPr lang="en-US"/>
+              <a:endParaRPr lang="pt-PT"/>
             </a:p>
           </c:txPr>
         </c:title>
@@ -2853,7 +2853,7 @@
                 <a:cs typeface="+mn-cs"/>
               </a:defRPr>
             </a:pPr>
-            <a:endParaRPr lang="en-US"/>
+            <a:endParaRPr lang="pt-PT"/>
           </a:p>
         </c:txPr>
         <c:crossAx val="627675727"/>
@@ -2886,7 +2886,7 @@
       <a:pPr>
         <a:defRPr/>
       </a:pPr>
-      <a:endParaRPr lang="en-US"/>
+      <a:endParaRPr lang="pt-PT"/>
     </a:p>
   </c:txPr>
   <c:externalData r:id="rId3">
@@ -2965,7 +2965,7 @@
               <a:cs typeface="+mn-cs"/>
             </a:defRPr>
           </a:pPr>
-          <a:endParaRPr lang="en-US"/>
+          <a:endParaRPr lang="pt-PT"/>
         </a:p>
       </c:txPr>
     </c:title>
@@ -3016,7 +3016,7 @@
                     <a:cs typeface="+mn-cs"/>
                   </a:defRPr>
                 </a:pPr>
-                <a:endParaRPr lang="en-US"/>
+                <a:endParaRPr lang="pt-PT"/>
               </a:p>
             </c:txPr>
             <c:dLblPos val="outEnd"/>
@@ -3172,7 +3172,7 @@
                   <a:cs typeface="+mn-cs"/>
                 </a:defRPr>
               </a:pPr>
-              <a:endParaRPr lang="en-US"/>
+              <a:endParaRPr lang="pt-PT"/>
             </a:p>
           </c:txPr>
         </c:title>
@@ -3210,7 +3210,7 @@
                 <a:cs typeface="+mn-cs"/>
               </a:defRPr>
             </a:pPr>
-            <a:endParaRPr lang="en-US"/>
+            <a:endParaRPr lang="pt-PT"/>
           </a:p>
         </c:txPr>
         <c:crossAx val="512461136"/>
@@ -3292,7 +3292,7 @@
                   <a:cs typeface="+mn-cs"/>
                 </a:defRPr>
               </a:pPr>
-              <a:endParaRPr lang="en-US"/>
+              <a:endParaRPr lang="pt-PT"/>
             </a:p>
           </c:txPr>
         </c:title>
@@ -3324,7 +3324,7 @@
                 <a:cs typeface="+mn-cs"/>
               </a:defRPr>
             </a:pPr>
-            <a:endParaRPr lang="en-US"/>
+            <a:endParaRPr lang="pt-PT"/>
           </a:p>
         </c:txPr>
         <c:crossAx val="512461968"/>
@@ -3357,7 +3357,7 @@
       <a:pPr>
         <a:defRPr/>
       </a:pPr>
-      <a:endParaRPr lang="en-US"/>
+      <a:endParaRPr lang="pt-PT"/>
     </a:p>
   </c:txPr>
   <c:externalData r:id="rId3">
@@ -3441,7 +3441,7 @@
               <a:cs typeface="+mn-cs"/>
             </a:defRPr>
           </a:pPr>
-          <a:endParaRPr lang="en-US"/>
+          <a:endParaRPr lang="pt-PT"/>
         </a:p>
       </c:txPr>
     </c:title>
@@ -3492,7 +3492,7 @@
                     <a:cs typeface="+mn-cs"/>
                   </a:defRPr>
                 </a:pPr>
-                <a:endParaRPr lang="en-US"/>
+                <a:endParaRPr lang="pt-PT"/>
               </a:p>
             </c:txPr>
             <c:dLblPos val="outEnd"/>
@@ -3648,7 +3648,7 @@
                   <a:cs typeface="+mn-cs"/>
                 </a:defRPr>
               </a:pPr>
-              <a:endParaRPr lang="en-US"/>
+              <a:endParaRPr lang="pt-PT"/>
             </a:p>
           </c:txPr>
         </c:title>
@@ -3686,7 +3686,7 @@
                 <a:cs typeface="+mn-cs"/>
               </a:defRPr>
             </a:pPr>
-            <a:endParaRPr lang="en-US"/>
+            <a:endParaRPr lang="pt-PT"/>
           </a:p>
         </c:txPr>
         <c:crossAx val="601713696"/>
@@ -3781,7 +3781,7 @@
                   <a:cs typeface="+mn-cs"/>
                 </a:defRPr>
               </a:pPr>
-              <a:endParaRPr lang="en-US"/>
+              <a:endParaRPr lang="pt-PT"/>
             </a:p>
           </c:txPr>
         </c:title>
@@ -3813,7 +3813,7 @@
                 <a:cs typeface="+mn-cs"/>
               </a:defRPr>
             </a:pPr>
-            <a:endParaRPr lang="en-US"/>
+            <a:endParaRPr lang="pt-PT"/>
           </a:p>
         </c:txPr>
         <c:crossAx val="601692896"/>
@@ -3846,7 +3846,7 @@
       <a:pPr>
         <a:defRPr/>
       </a:pPr>
-      <a:endParaRPr lang="en-US"/>
+      <a:endParaRPr lang="pt-PT"/>
     </a:p>
   </c:txPr>
   <c:externalData r:id="rId3">
@@ -3930,7 +3930,7 @@
               <a:cs typeface="+mn-cs"/>
             </a:defRPr>
           </a:pPr>
-          <a:endParaRPr lang="en-US"/>
+          <a:endParaRPr lang="pt-PT"/>
         </a:p>
       </c:txPr>
     </c:title>
@@ -3981,7 +3981,7 @@
                     <a:cs typeface="+mn-cs"/>
                   </a:defRPr>
                 </a:pPr>
-                <a:endParaRPr lang="en-US"/>
+                <a:endParaRPr lang="pt-PT"/>
               </a:p>
             </c:txPr>
             <c:dLblPos val="outEnd"/>
@@ -4137,7 +4137,7 @@
                   <a:cs typeface="+mn-cs"/>
                 </a:defRPr>
               </a:pPr>
-              <a:endParaRPr lang="en-US"/>
+              <a:endParaRPr lang="pt-PT"/>
             </a:p>
           </c:txPr>
         </c:title>
@@ -4175,7 +4175,7 @@
                 <a:cs typeface="+mn-cs"/>
               </a:defRPr>
             </a:pPr>
-            <a:endParaRPr lang="en-US"/>
+            <a:endParaRPr lang="pt-PT"/>
           </a:p>
         </c:txPr>
         <c:crossAx val="601718272"/>
@@ -4262,7 +4262,7 @@
                   <a:cs typeface="+mn-cs"/>
                 </a:defRPr>
               </a:pPr>
-              <a:endParaRPr lang="en-US"/>
+              <a:endParaRPr lang="pt-PT"/>
             </a:p>
           </c:txPr>
         </c:title>
@@ -4294,7 +4294,7 @@
                 <a:cs typeface="+mn-cs"/>
               </a:defRPr>
             </a:pPr>
-            <a:endParaRPr lang="en-US"/>
+            <a:endParaRPr lang="pt-PT"/>
           </a:p>
         </c:txPr>
         <c:crossAx val="601724096"/>
@@ -4327,7 +4327,7 @@
       <a:pPr>
         <a:defRPr/>
       </a:pPr>
-      <a:endParaRPr lang="en-US"/>
+      <a:endParaRPr lang="pt-PT"/>
     </a:p>
   </c:txPr>
   <c:externalData r:id="rId3">
@@ -4406,7 +4406,7 @@
               <a:cs typeface="+mn-cs"/>
             </a:defRPr>
           </a:pPr>
-          <a:endParaRPr lang="en-US"/>
+          <a:endParaRPr lang="pt-PT"/>
         </a:p>
       </c:txPr>
     </c:title>
@@ -4457,7 +4457,7 @@
                     <a:cs typeface="+mn-cs"/>
                   </a:defRPr>
                 </a:pPr>
-                <a:endParaRPr lang="en-US"/>
+                <a:endParaRPr lang="pt-PT"/>
               </a:p>
             </c:txPr>
             <c:dLblPos val="outEnd"/>
@@ -4618,7 +4618,7 @@
                   <a:cs typeface="+mn-cs"/>
                 </a:defRPr>
               </a:pPr>
-              <a:endParaRPr lang="en-US"/>
+              <a:endParaRPr lang="pt-PT"/>
             </a:p>
           </c:txPr>
         </c:title>
@@ -4656,7 +4656,7 @@
                 <a:cs typeface="+mn-cs"/>
               </a:defRPr>
             </a:pPr>
-            <a:endParaRPr lang="en-US"/>
+            <a:endParaRPr lang="pt-PT"/>
           </a:p>
         </c:txPr>
         <c:crossAx val="601719936"/>
@@ -4743,7 +4743,7 @@
                   <a:cs typeface="+mn-cs"/>
                 </a:defRPr>
               </a:pPr>
-              <a:endParaRPr lang="en-US"/>
+              <a:endParaRPr lang="pt-PT"/>
             </a:p>
           </c:txPr>
         </c:title>
@@ -4775,7 +4775,7 @@
                 <a:cs typeface="+mn-cs"/>
               </a:defRPr>
             </a:pPr>
-            <a:endParaRPr lang="en-US"/>
+            <a:endParaRPr lang="pt-PT"/>
           </a:p>
         </c:txPr>
         <c:crossAx val="601717024"/>
@@ -4808,7 +4808,7 @@
       <a:pPr>
         <a:defRPr/>
       </a:pPr>
-      <a:endParaRPr lang="en-US"/>
+      <a:endParaRPr lang="pt-PT"/>
     </a:p>
   </c:txPr>
   <c:externalData r:id="rId3">
@@ -4892,7 +4892,7 @@
               <a:cs typeface="+mn-cs"/>
             </a:defRPr>
           </a:pPr>
-          <a:endParaRPr lang="en-US"/>
+          <a:endParaRPr lang="pt-PT"/>
         </a:p>
       </c:txPr>
     </c:title>
@@ -4943,7 +4943,7 @@
                     <a:cs typeface="+mn-cs"/>
                   </a:defRPr>
                 </a:pPr>
-                <a:endParaRPr lang="en-US"/>
+                <a:endParaRPr lang="pt-PT"/>
               </a:p>
             </c:txPr>
             <c:dLblPos val="outEnd"/>
@@ -5109,7 +5109,7 @@
                   <a:cs typeface="+mn-cs"/>
                 </a:defRPr>
               </a:pPr>
-              <a:endParaRPr lang="en-US"/>
+              <a:endParaRPr lang="pt-PT"/>
             </a:p>
           </c:txPr>
         </c:title>
@@ -5147,7 +5147,7 @@
                 <a:cs typeface="+mn-cs"/>
               </a:defRPr>
             </a:pPr>
-            <a:endParaRPr lang="en-US"/>
+            <a:endParaRPr lang="pt-PT"/>
           </a:p>
         </c:txPr>
         <c:crossAx val="601689152"/>
@@ -5239,7 +5239,7 @@
                   <a:cs typeface="+mn-cs"/>
                 </a:defRPr>
               </a:pPr>
-              <a:endParaRPr lang="en-US"/>
+              <a:endParaRPr lang="pt-PT"/>
             </a:p>
           </c:txPr>
         </c:title>
@@ -5271,7 +5271,7 @@
                 <a:cs typeface="+mn-cs"/>
               </a:defRPr>
             </a:pPr>
-            <a:endParaRPr lang="en-US"/>
+            <a:endParaRPr lang="pt-PT"/>
           </a:p>
         </c:txPr>
         <c:crossAx val="601694976"/>
@@ -5304,7 +5304,7 @@
       <a:pPr>
         <a:defRPr/>
       </a:pPr>
-      <a:endParaRPr lang="en-US"/>
+      <a:endParaRPr lang="pt-PT"/>
     </a:p>
   </c:txPr>
   <c:externalData r:id="rId3">
@@ -5388,7 +5388,7 @@
               <a:cs typeface="+mn-cs"/>
             </a:defRPr>
           </a:pPr>
-          <a:endParaRPr lang="en-US"/>
+          <a:endParaRPr lang="pt-PT"/>
         </a:p>
       </c:txPr>
     </c:title>
@@ -5439,7 +5439,7 @@
                     <a:cs typeface="+mn-cs"/>
                   </a:defRPr>
                 </a:pPr>
-                <a:endParaRPr lang="en-US"/>
+                <a:endParaRPr lang="pt-PT"/>
               </a:p>
             </c:txPr>
             <c:dLblPos val="outEnd"/>
@@ -5605,7 +5605,7 @@
                   <a:cs typeface="+mn-cs"/>
                 </a:defRPr>
               </a:pPr>
-              <a:endParaRPr lang="en-US"/>
+              <a:endParaRPr lang="pt-PT"/>
             </a:p>
           </c:txPr>
         </c:title>
@@ -5643,7 +5643,7 @@
                 <a:cs typeface="+mn-cs"/>
               </a:defRPr>
             </a:pPr>
-            <a:endParaRPr lang="en-US"/>
+            <a:endParaRPr lang="pt-PT"/>
           </a:p>
         </c:txPr>
         <c:crossAx val="497476544"/>
@@ -5735,7 +5735,7 @@
                   <a:cs typeface="+mn-cs"/>
                 </a:defRPr>
               </a:pPr>
-              <a:endParaRPr lang="en-US"/>
+              <a:endParaRPr lang="pt-PT"/>
             </a:p>
           </c:txPr>
         </c:title>
@@ -5767,7 +5767,7 @@
                 <a:cs typeface="+mn-cs"/>
               </a:defRPr>
             </a:pPr>
-            <a:endParaRPr lang="en-US"/>
+            <a:endParaRPr lang="pt-PT"/>
           </a:p>
         </c:txPr>
         <c:crossAx val="497479872"/>
@@ -5800,7 +5800,7 @@
       <a:pPr>
         <a:defRPr/>
       </a:pPr>
-      <a:endParaRPr lang="en-US"/>
+      <a:endParaRPr lang="pt-PT"/>
     </a:p>
   </c:txPr>
   <c:externalData r:id="rId3">
@@ -16216,7 +16216,7 @@
         <p:spPr>
           <a:xfrm>
             <a:off x="839788" y="1178351"/>
-            <a:ext cx="10804254" cy="2887811"/>
+            <a:ext cx="10804254" cy="2807723"/>
           </a:xfrm>
         </p:spPr>
         <p:txBody>
@@ -16852,7 +16852,7 @@
             <a:pPr algn="just"/>
             <a:r>
               <a:rPr lang="pt-PT" dirty="0"/>
-              <a:t>	Para a implementação dos algoritmos foram usadas listas, mesmo para algoritmos que usar filas ou filas de prioridade na sua implementação, como é o caso do BFS e do A*, sendo que, nestes dois algoritmos, as listas são operadas de forma diferente.</a:t>
+              <a:t>	Para a implementação dos algoritmos foram usadas listas, mesmo para algoritmos que usam filas ou filas de prioridade na sua implementação, como é o caso do BFS e do A*, sendo que, nestes dois algoritmos, as listas são operadas de forma diferente.</a:t>
             </a:r>
           </a:p>
           <a:p>
@@ -17260,7 +17260,7 @@
             <a:pPr algn="ctr"/>
             <a:r>
               <a:rPr lang="pt-PT" b="1" dirty="0"/>
-              <a:t>Resultados Experimentais</a:t>
+              <a:t>Resultados experimentais</a:t>
             </a:r>
           </a:p>
         </p:txBody>

</xml_diff>